<commit_message>
extra slide for presentation
</commit_message>
<xml_diff>
--- a/presentation/assignment.pptx
+++ b/presentation/assignment.pptx
@@ -6,14 +6,15 @@
     <p:sldMasterId id="2147483661" r:id="rId2"/>
   </p:sldMasterIdLst>
   <p:notesMasterIdLst>
-    <p:notesMasterId r:id="rId8"/>
+    <p:notesMasterId r:id="rId9"/>
   </p:notesMasterIdLst>
   <p:sldIdLst>
     <p:sldId id="256" r:id="rId3"/>
     <p:sldId id="257" r:id="rId4"/>
     <p:sldId id="259" r:id="rId5"/>
-    <p:sldId id="261" r:id="rId6"/>
-    <p:sldId id="260" r:id="rId7"/>
+    <p:sldId id="262" r:id="rId6"/>
+    <p:sldId id="261" r:id="rId7"/>
+    <p:sldId id="260" r:id="rId8"/>
   </p:sldIdLst>
   <p:sldSz cx="12192000" cy="6858000"/>
   <p:notesSz cx="6858000" cy="9144000"/>
@@ -112,6 +113,11 @@
       </a:defRPr>
     </a:lvl9pPr>
   </p:defaultTextStyle>
+  <p:extLst>
+    <p:ext uri="{EFAFB233-063F-42B5-8137-9DF3F51BA10A}">
+      <p15:sldGuideLst xmlns:p15="http://schemas.microsoft.com/office/powerpoint/2012/main"/>
+    </p:ext>
+  </p:extLst>
 </p:presentation>
 </file>
 
@@ -6258,7 +6264,7 @@
       </p:grpSpPr>
       <p:sp>
         <p:nvSpPr>
-          <p:cNvPr id="94" name="CustomShape 1"/>
+          <p:cNvPr id="96" name="CustomShape 1"/>
           <p:cNvSpPr/>
           <p:nvPr/>
         </p:nvSpPr>
@@ -6291,13 +6297,8 @@
           <a:bodyPr lIns="90000" tIns="45000" rIns="90000" bIns="45000" anchor="ctr"/>
           <a:lstStyle/>
           <a:p>
-            <a:pPr>
-              <a:lnSpc>
-                <a:spcPct val="100000"/>
-              </a:lnSpc>
-            </a:pPr>
             <a:r>
-              <a:rPr lang="en-US" sz="3800" b="1" strike="noStrike" spc="-1" dirty="0">
+              <a:rPr lang="en-US" sz="3800" b="1" spc="-1" dirty="0">
                 <a:solidFill>
                   <a:srgbClr val="023A4F"/>
                 </a:solidFill>
@@ -6307,27 +6308,25 @@
                   </a:solidFill>
                 </a:uFill>
                 <a:latin typeface="Objectivity"/>
-                <a:ea typeface="DejaVu Sans"/>
               </a:rPr>
               <a:t>Assignment (2)</a:t>
             </a:r>
-            <a:endParaRPr lang="en-US" sz="3800" b="0" strike="noStrike" spc="-1" dirty="0">
-              <a:solidFill>
-                <a:srgbClr val="000000"/>
-              </a:solidFill>
-              <a:uFill>
-                <a:solidFill>
-                  <a:srgbClr val="FFFFFF"/>
-                </a:solidFill>
-              </a:uFill>
-              <a:latin typeface="Arial"/>
-            </a:endParaRPr>
-          </a:p>
-        </p:txBody>
-      </p:sp>
-      <p:sp>
-        <p:nvSpPr>
-          <p:cNvPr id="95" name="CustomShape 2"/>
+            <a:endParaRPr lang="en-US" sz="3800" spc="-1" dirty="0">
+              <a:solidFill>
+                <a:srgbClr val="000000"/>
+              </a:solidFill>
+              <a:uFill>
+                <a:solidFill>
+                  <a:srgbClr val="FFFFFF"/>
+                </a:solidFill>
+              </a:uFill>
+            </a:endParaRPr>
+          </a:p>
+        </p:txBody>
+      </p:sp>
+      <p:sp>
+        <p:nvSpPr>
+          <p:cNvPr id="97" name="CustomShape 2"/>
           <p:cNvSpPr/>
           <p:nvPr/>
         </p:nvSpPr>
@@ -6361,9 +6360,6 @@
           <a:lstStyle/>
           <a:p>
             <a:pPr marL="228600" indent="-227160">
-              <a:lnSpc>
-                <a:spcPct val="100000"/>
-              </a:lnSpc>
               <a:spcBef>
                 <a:spcPts val="1001"/>
               </a:spcBef>
@@ -6385,10 +6381,118 @@
                 </a:uFill>
                 <a:latin typeface="IBM Plex Sans"/>
               </a:rPr>
-              <a:t>https://</a:t>
+              <a:t>Reliable file transfer via </a:t>
             </a:r>
             <a:r>
-              <a:rPr lang="en-US" sz="2400" spc="-1" dirty="0" err="1">
+              <a:rPr lang="en-US" sz="2400" b="0" strike="noStrike" spc="-1" dirty="0">
+                <a:solidFill>
+                  <a:srgbClr val="023A4F"/>
+                </a:solidFill>
+                <a:uFill>
+                  <a:solidFill>
+                    <a:srgbClr val="FFFFFF"/>
+                  </a:solidFill>
+                </a:uFill>
+                <a:latin typeface="IBM Plex Sans"/>
+                <a:ea typeface="DejaVu Sans"/>
+              </a:rPr>
+              <a:t>UDP-based protocol over </a:t>
+            </a:r>
+            <a:r>
+              <a:rPr lang="en-US" sz="2400" b="0" strike="noStrike" spc="-1" dirty="0" err="1">
+                <a:solidFill>
+                  <a:srgbClr val="023A4F"/>
+                </a:solidFill>
+                <a:uFill>
+                  <a:solidFill>
+                    <a:srgbClr val="FFFFFF"/>
+                  </a:solidFill>
+                </a:uFill>
+                <a:latin typeface="IBM Plex Sans"/>
+                <a:ea typeface="DejaVu Sans"/>
+              </a:rPr>
+              <a:t>Wifi</a:t>
+            </a:r>
+            <a:endParaRPr lang="en-US" sz="2400" b="0" strike="noStrike" spc="-1" dirty="0">
+              <a:solidFill>
+                <a:srgbClr val="023A4F"/>
+              </a:solidFill>
+              <a:uFill>
+                <a:solidFill>
+                  <a:srgbClr val="FFFFFF"/>
+                </a:solidFill>
+              </a:uFill>
+              <a:latin typeface="IBM Plex Sans"/>
+              <a:ea typeface="DejaVu Sans"/>
+            </a:endParaRPr>
+          </a:p>
+          <a:p>
+            <a:pPr marL="228600" indent="-227160">
+              <a:spcBef>
+                <a:spcPts val="1001"/>
+              </a:spcBef>
+              <a:buClr>
+                <a:srgbClr val="023A4F"/>
+              </a:buClr>
+              <a:buFont typeface="Arial"/>
+              <a:buChar char="•"/>
+            </a:pPr>
+            <a:r>
+              <a:rPr lang="en-US" sz="2400" spc="-1" dirty="0">
+                <a:solidFill>
+                  <a:srgbClr val="023A4F"/>
+                </a:solidFill>
+                <a:uFill>
+                  <a:solidFill>
+                    <a:srgbClr val="FFFFFF"/>
+                  </a:solidFill>
+                </a:uFill>
+                <a:latin typeface="IBM Plex Sans"/>
+                <a:ea typeface="DejaVu Sans"/>
+              </a:rPr>
+              <a:t>Client-Server app</a:t>
+            </a:r>
+          </a:p>
+          <a:p>
+            <a:pPr marL="228600" indent="-227160">
+              <a:spcBef>
+                <a:spcPts val="1001"/>
+              </a:spcBef>
+              <a:buClr>
+                <a:srgbClr val="023A4F"/>
+              </a:buClr>
+              <a:buFont typeface="Arial"/>
+              <a:buChar char="•"/>
+            </a:pPr>
+            <a:r>
+              <a:rPr lang="en-US" sz="2400" spc="-1" dirty="0">
+                <a:solidFill>
+                  <a:srgbClr val="023A4F"/>
+                </a:solidFill>
+                <a:uFill>
+                  <a:solidFill>
+                    <a:srgbClr val="FFFFFF"/>
+                  </a:solidFill>
+                </a:uFill>
+                <a:latin typeface="IBM Plex Sans"/>
+                <a:ea typeface="DejaVu Sans"/>
+              </a:rPr>
+              <a:t>Protocol &gt; feature-set</a:t>
+            </a:r>
+          </a:p>
+          <a:p>
+            <a:pPr marL="228600" indent="-227160">
+              <a:spcBef>
+                <a:spcPts val="1001"/>
+              </a:spcBef>
+              <a:buClr>
+                <a:srgbClr val="023A4F"/>
+              </a:buClr>
+              <a:buFont typeface="Arial"/>
+              <a:buChar char="•"/>
+            </a:pPr>
+            <a:r>
+              <a:rPr lang="en-US" sz="2400" spc="-1" dirty="0">
                 <a:solidFill>
                   <a:srgbClr val="023A4F"/>
                 </a:solidFill>
@@ -6399,104 +6503,49 @@
                 </a:uFill>
                 <a:latin typeface="IBM Plex Sans"/>
               </a:rPr>
-              <a:t>github.com</a:t>
+              <a:t>Individually</a:t>
             </a:r>
-            <a:r>
-              <a:rPr lang="en-US" sz="2400" spc="-1" dirty="0">
-                <a:solidFill>
-                  <a:srgbClr val="023A4F"/>
-                </a:solidFill>
-                <a:uFill>
-                  <a:solidFill>
-                    <a:srgbClr val="FFFFFF"/>
-                  </a:solidFill>
-                </a:uFill>
-                <a:latin typeface="IBM Plex Sans"/>
-              </a:rPr>
-              <a:t>/</a:t>
-            </a:r>
-            <a:r>
-              <a:rPr lang="en-US" sz="2400" spc="-1" dirty="0" err="1">
-                <a:solidFill>
-                  <a:srgbClr val="023A4F"/>
-                </a:solidFill>
-                <a:uFill>
-                  <a:solidFill>
-                    <a:srgbClr val="FFFFFF"/>
-                  </a:solidFill>
-                </a:uFill>
-                <a:latin typeface="IBM Plex Sans"/>
-              </a:rPr>
-              <a:t>nedap</a:t>
-            </a:r>
-            <a:r>
-              <a:rPr lang="en-US" sz="2400" spc="-1" dirty="0">
-                <a:solidFill>
-                  <a:srgbClr val="023A4F"/>
-                </a:solidFill>
-                <a:uFill>
-                  <a:solidFill>
-                    <a:srgbClr val="FFFFFF"/>
-                  </a:solidFill>
-                </a:uFill>
-                <a:latin typeface="IBM Plex Sans"/>
-              </a:rPr>
-              <a:t>/nu-module-2</a:t>
-            </a:r>
+            <a:endParaRPr lang="en-US" sz="2400" spc="-1" dirty="0">
+              <a:solidFill>
+                <a:srgbClr val="000000"/>
+              </a:solidFill>
+              <a:uFill>
+                <a:solidFill>
+                  <a:srgbClr val="FFFFFF"/>
+                </a:solidFill>
+              </a:uFill>
+            </a:endParaRPr>
+          </a:p>
+          <a:p>
+            <a:pPr marL="228600" indent="-227160">
+              <a:spcBef>
+                <a:spcPts val="1001"/>
+              </a:spcBef>
+              <a:buClr>
+                <a:srgbClr val="023A4F"/>
+              </a:buClr>
+              <a:buFont typeface="Arial"/>
+              <a:buChar char="•"/>
+            </a:pPr>
             <a:endParaRPr lang="en-US" sz="2400" b="0" strike="noStrike" spc="-1" dirty="0">
               <a:solidFill>
-                <a:srgbClr val="000000"/>
-              </a:solidFill>
-              <a:uFill>
-                <a:solidFill>
-                  <a:srgbClr val="FFFFFF"/>
-                </a:solidFill>
-              </a:uFill>
-              <a:latin typeface="Arial"/>
-            </a:endParaRPr>
-          </a:p>
-        </p:txBody>
-      </p:sp>
-      <p:pic>
-        <p:nvPicPr>
-          <p:cNvPr id="3" name="Picture 2">
-            <a:extLst>
-              <a:ext uri="{FF2B5EF4-FFF2-40B4-BE49-F238E27FC236}">
-                <a16:creationId xmlns:a16="http://schemas.microsoft.com/office/drawing/2014/main" id="{EA3396DB-0A7E-CB45-A716-17AAB41EB2C8}"/>
-              </a:ext>
-            </a:extLst>
-          </p:cNvPr>
-          <p:cNvPicPr>
-            <a:picLocks noChangeAspect="1"/>
-          </p:cNvPicPr>
-          <p:nvPr/>
-        </p:nvPicPr>
-        <p:blipFill>
-          <a:blip r:embed="rId2">
-            <a:extLst>
-              <a:ext uri="{28A0092B-C50C-407E-A947-70E740481C1C}">
-                <a14:useLocalDpi xmlns:a14="http://schemas.microsoft.com/office/drawing/2010/main" val="0"/>
-              </a:ext>
-            </a:extLst>
-          </a:blip>
-          <a:stretch>
-            <a:fillRect/>
-          </a:stretch>
-        </p:blipFill>
-        <p:spPr>
-          <a:xfrm>
-            <a:off x="4721690" y="2631890"/>
-            <a:ext cx="2349500" cy="2349500"/>
-          </a:xfrm>
-          <a:prstGeom prst="rect">
-            <a:avLst/>
-          </a:prstGeom>
-        </p:spPr>
-      </p:pic>
+                <a:srgbClr val="023A4F"/>
+              </a:solidFill>
+              <a:uFill>
+                <a:solidFill>
+                  <a:srgbClr val="FFFFFF"/>
+                </a:solidFill>
+              </a:uFill>
+              <a:latin typeface="IBM Plex Sans"/>
+              <a:ea typeface="DejaVu Sans"/>
+            </a:endParaRPr>
+          </a:p>
+        </p:txBody>
+      </p:sp>
     </p:spTree>
     <p:extLst>
       <p:ext uri="{BB962C8B-B14F-4D97-AF65-F5344CB8AC3E}">
-        <p14:creationId xmlns:p14="http://schemas.microsoft.com/office/powerpoint/2010/main" val="2244016554"/>
+        <p14:creationId xmlns:p14="http://schemas.microsoft.com/office/powerpoint/2010/main" val="2662065942"/>
       </p:ext>
     </p:extLst>
   </p:cSld>
@@ -6552,6 +6601,300 @@
       </p:grpSpPr>
       <p:sp>
         <p:nvSpPr>
+          <p:cNvPr id="94" name="CustomShape 1"/>
+          <p:cNvSpPr/>
+          <p:nvPr/>
+        </p:nvSpPr>
+        <p:spPr>
+          <a:xfrm>
+            <a:off x="440640" y="160560"/>
+            <a:ext cx="10911600" cy="1324080"/>
+          </a:xfrm>
+          <a:prstGeom prst="rect">
+            <a:avLst/>
+          </a:prstGeom>
+          <a:noFill/>
+          <a:ln>
+            <a:noFill/>
+          </a:ln>
+        </p:spPr>
+        <p:style>
+          <a:lnRef idx="0">
+            <a:scrgbClr r="0" g="0" b="0"/>
+          </a:lnRef>
+          <a:fillRef idx="0">
+            <a:scrgbClr r="0" g="0" b="0"/>
+          </a:fillRef>
+          <a:effectRef idx="0">
+            <a:scrgbClr r="0" g="0" b="0"/>
+          </a:effectRef>
+          <a:fontRef idx="minor"/>
+        </p:style>
+        <p:txBody>
+          <a:bodyPr lIns="90000" tIns="45000" rIns="90000" bIns="45000" anchor="ctr"/>
+          <a:lstStyle/>
+          <a:p>
+            <a:pPr>
+              <a:lnSpc>
+                <a:spcPct val="100000"/>
+              </a:lnSpc>
+            </a:pPr>
+            <a:r>
+              <a:rPr lang="en-US" sz="3800" b="1" strike="noStrike" spc="-1" dirty="0">
+                <a:solidFill>
+                  <a:srgbClr val="023A4F"/>
+                </a:solidFill>
+                <a:uFill>
+                  <a:solidFill>
+                    <a:srgbClr val="FFFFFF"/>
+                  </a:solidFill>
+                </a:uFill>
+                <a:latin typeface="Objectivity"/>
+                <a:ea typeface="DejaVu Sans"/>
+              </a:rPr>
+              <a:t>Assignment (3)</a:t>
+            </a:r>
+            <a:endParaRPr lang="en-US" sz="3800" b="0" strike="noStrike" spc="-1" dirty="0">
+              <a:solidFill>
+                <a:srgbClr val="000000"/>
+              </a:solidFill>
+              <a:uFill>
+                <a:solidFill>
+                  <a:srgbClr val="FFFFFF"/>
+                </a:solidFill>
+              </a:uFill>
+              <a:latin typeface="Arial"/>
+            </a:endParaRPr>
+          </a:p>
+        </p:txBody>
+      </p:sp>
+      <p:sp>
+        <p:nvSpPr>
+          <p:cNvPr id="95" name="CustomShape 2"/>
+          <p:cNvSpPr/>
+          <p:nvPr/>
+        </p:nvSpPr>
+        <p:spPr>
+          <a:xfrm>
+            <a:off x="440640" y="1845360"/>
+            <a:ext cx="10911600" cy="3922560"/>
+          </a:xfrm>
+          <a:prstGeom prst="rect">
+            <a:avLst/>
+          </a:prstGeom>
+          <a:noFill/>
+          <a:ln>
+            <a:noFill/>
+          </a:ln>
+        </p:spPr>
+        <p:style>
+          <a:lnRef idx="0">
+            <a:scrgbClr r="0" g="0" b="0"/>
+          </a:lnRef>
+          <a:fillRef idx="0">
+            <a:scrgbClr r="0" g="0" b="0"/>
+          </a:fillRef>
+          <a:effectRef idx="0">
+            <a:scrgbClr r="0" g="0" b="0"/>
+          </a:effectRef>
+          <a:fontRef idx="minor"/>
+        </p:style>
+        <p:txBody>
+          <a:bodyPr lIns="90000" tIns="45000" rIns="90000" bIns="45000"/>
+          <a:lstStyle/>
+          <a:p>
+            <a:pPr marL="228600" indent="-227160">
+              <a:lnSpc>
+                <a:spcPct val="100000"/>
+              </a:lnSpc>
+              <a:spcBef>
+                <a:spcPts val="1001"/>
+              </a:spcBef>
+              <a:buClr>
+                <a:srgbClr val="023A4F"/>
+              </a:buClr>
+              <a:buFont typeface="Arial"/>
+              <a:buChar char="•"/>
+            </a:pPr>
+            <a:r>
+              <a:rPr lang="en-US" sz="2400" spc="-1" dirty="0">
+                <a:solidFill>
+                  <a:srgbClr val="023A4F"/>
+                </a:solidFill>
+                <a:uFill>
+                  <a:solidFill>
+                    <a:srgbClr val="FFFFFF"/>
+                  </a:solidFill>
+                </a:uFill>
+                <a:latin typeface="IBM Plex Sans"/>
+              </a:rPr>
+              <a:t>https://</a:t>
+            </a:r>
+            <a:r>
+              <a:rPr lang="en-US" sz="2400" spc="-1" dirty="0" err="1">
+                <a:solidFill>
+                  <a:srgbClr val="023A4F"/>
+                </a:solidFill>
+                <a:uFill>
+                  <a:solidFill>
+                    <a:srgbClr val="FFFFFF"/>
+                  </a:solidFill>
+                </a:uFill>
+                <a:latin typeface="IBM Plex Sans"/>
+              </a:rPr>
+              <a:t>github.com</a:t>
+            </a:r>
+            <a:r>
+              <a:rPr lang="en-US" sz="2400" spc="-1" dirty="0">
+                <a:solidFill>
+                  <a:srgbClr val="023A4F"/>
+                </a:solidFill>
+                <a:uFill>
+                  <a:solidFill>
+                    <a:srgbClr val="FFFFFF"/>
+                  </a:solidFill>
+                </a:uFill>
+                <a:latin typeface="IBM Plex Sans"/>
+              </a:rPr>
+              <a:t>/</a:t>
+            </a:r>
+            <a:r>
+              <a:rPr lang="en-US" sz="2400" spc="-1" dirty="0" err="1">
+                <a:solidFill>
+                  <a:srgbClr val="023A4F"/>
+                </a:solidFill>
+                <a:uFill>
+                  <a:solidFill>
+                    <a:srgbClr val="FFFFFF"/>
+                  </a:solidFill>
+                </a:uFill>
+                <a:latin typeface="IBM Plex Sans"/>
+              </a:rPr>
+              <a:t>nedap</a:t>
+            </a:r>
+            <a:r>
+              <a:rPr lang="en-US" sz="2400" spc="-1" dirty="0">
+                <a:solidFill>
+                  <a:srgbClr val="023A4F"/>
+                </a:solidFill>
+                <a:uFill>
+                  <a:solidFill>
+                    <a:srgbClr val="FFFFFF"/>
+                  </a:solidFill>
+                </a:uFill>
+                <a:latin typeface="IBM Plex Sans"/>
+              </a:rPr>
+              <a:t>/nu-module-2</a:t>
+            </a:r>
+            <a:endParaRPr lang="en-US" sz="2400" b="0" strike="noStrike" spc="-1" dirty="0">
+              <a:solidFill>
+                <a:srgbClr val="000000"/>
+              </a:solidFill>
+              <a:uFill>
+                <a:solidFill>
+                  <a:srgbClr val="FFFFFF"/>
+                </a:solidFill>
+              </a:uFill>
+              <a:latin typeface="Arial"/>
+            </a:endParaRPr>
+          </a:p>
+        </p:txBody>
+      </p:sp>
+      <p:pic>
+        <p:nvPicPr>
+          <p:cNvPr id="3" name="Picture 2">
+            <a:extLst>
+              <a:ext uri="{FF2B5EF4-FFF2-40B4-BE49-F238E27FC236}">
+                <a16:creationId xmlns:a16="http://schemas.microsoft.com/office/drawing/2014/main" id="{EA3396DB-0A7E-CB45-A716-17AAB41EB2C8}"/>
+              </a:ext>
+            </a:extLst>
+          </p:cNvPr>
+          <p:cNvPicPr>
+            <a:picLocks noChangeAspect="1"/>
+          </p:cNvPicPr>
+          <p:nvPr/>
+        </p:nvPicPr>
+        <p:blipFill>
+          <a:blip r:embed="rId2">
+            <a:extLst>
+              <a:ext uri="{28A0092B-C50C-407E-A947-70E740481C1C}">
+                <a14:useLocalDpi xmlns:a14="http://schemas.microsoft.com/office/drawing/2010/main" val="0"/>
+              </a:ext>
+            </a:extLst>
+          </a:blip>
+          <a:stretch>
+            <a:fillRect/>
+          </a:stretch>
+        </p:blipFill>
+        <p:spPr>
+          <a:xfrm>
+            <a:off x="4721690" y="2631890"/>
+            <a:ext cx="2349500" cy="2349500"/>
+          </a:xfrm>
+          <a:prstGeom prst="rect">
+            <a:avLst/>
+          </a:prstGeom>
+        </p:spPr>
+      </p:pic>
+    </p:spTree>
+    <p:extLst>
+      <p:ext uri="{BB962C8B-B14F-4D97-AF65-F5344CB8AC3E}">
+        <p14:creationId xmlns:p14="http://schemas.microsoft.com/office/powerpoint/2010/main" val="2244016554"/>
+      </p:ext>
+    </p:extLst>
+  </p:cSld>
+  <p:clrMapOvr>
+    <a:masterClrMapping/>
+  </p:clrMapOvr>
+  <p:timing>
+    <p:tnLst>
+      <p:par>
+        <p:cTn id="1" dur="indefinite" restart="never" nodeType="tmRoot">
+          <p:childTnLst>
+            <p:seq>
+              <p:cTn id="2" nodeType="mainSeq"/>
+              <p:prevCondLst>
+                <p:cond evt="onPrev" delay="0">
+                  <p:tgtEl>
+                    <p:sldTgt/>
+                  </p:tgtEl>
+                </p:cond>
+              </p:prevCondLst>
+              <p:nextCondLst>
+                <p:cond evt="onNext" delay="0">
+                  <p:tgtEl>
+                    <p:sldTgt/>
+                  </p:tgtEl>
+                </p:cond>
+              </p:nextCondLst>
+            </p:seq>
+          </p:childTnLst>
+        </p:cTn>
+      </p:par>
+    </p:tnLst>
+  </p:timing>
+</p:sld>
+</file>
+
+<file path=ppt/slides/slide6.xml><?xml version="1.0" encoding="utf-8"?>
+<p:sld xmlns:a="http://schemas.openxmlformats.org/drawingml/2006/main" xmlns:r="http://schemas.openxmlformats.org/officeDocument/2006/relationships" xmlns:p="http://schemas.openxmlformats.org/presentationml/2006/main">
+  <p:cSld>
+    <p:spTree>
+      <p:nvGrpSpPr>
+        <p:cNvPr id="1" name=""/>
+        <p:cNvGrpSpPr/>
+        <p:nvPr/>
+      </p:nvGrpSpPr>
+      <p:grpSpPr>
+        <a:xfrm>
+          <a:off x="0" y="0"/>
+          <a:ext cx="0" cy="0"/>
+          <a:chOff x="0" y="0"/>
+          <a:chExt cx="0" cy="0"/>
+        </a:xfrm>
+      </p:grpSpPr>
+      <p:sp>
+        <p:nvSpPr>
           <p:cNvPr id="96" name="CustomShape 1"/>
           <p:cNvSpPr/>
           <p:nvPr/>
@@ -6722,6 +7065,35 @@
                 <a:ea typeface="DejaVu Sans"/>
               </a:rPr>
               <a:t>Contact us when you’re having problems.</a:t>
+            </a:r>
+          </a:p>
+          <a:p>
+            <a:pPr marL="228600" indent="-227160">
+              <a:lnSpc>
+                <a:spcPct val="100000"/>
+              </a:lnSpc>
+              <a:spcBef>
+                <a:spcPts val="1001"/>
+              </a:spcBef>
+              <a:buClr>
+                <a:srgbClr val="023A4F"/>
+              </a:buClr>
+              <a:buFont typeface="Arial"/>
+              <a:buChar char="•"/>
+            </a:pPr>
+            <a:r>
+              <a:rPr lang="en-US" sz="2400" spc="-1" dirty="0">
+                <a:solidFill>
+                  <a:srgbClr val="023A4F"/>
+                </a:solidFill>
+                <a:uFill>
+                  <a:solidFill>
+                    <a:srgbClr val="FFFFFF"/>
+                  </a:solidFill>
+                </a:uFill>
+                <a:latin typeface="IBM Plex Sans"/>
+              </a:rPr>
+              <a:t>Plan ahead.</a:t>
             </a:r>
             <a:endParaRPr lang="en-US" sz="2400" b="0" strike="noStrike" spc="-1" dirty="0">
               <a:solidFill>

</xml_diff>